<commit_message>
PPT updated with links to code
</commit_message>
<xml_diff>
--- a/Meetup03022017/RustIntroduction-FinlandMeetup.pptx
+++ b/Meetup03022017/RustIntroduction-FinlandMeetup.pptx
@@ -256,7 +256,7 @@
           <a:p>
             <a:fld id="{E4D96187-924C-44A2-A7A8-F3B9288F3254}" type="datetimeFigureOut">
               <a:rPr lang="en-US" smtClean="0"/>
-              <a:t>2/3/2017</a:t>
+              <a:t>03-Feb-17</a:t>
             </a:fld>
             <a:endParaRPr lang="en-US"/>
           </a:p>
@@ -424,7 +424,7 @@
           <a:p>
             <a:fld id="{E4D96187-924C-44A2-A7A8-F3B9288F3254}" type="datetimeFigureOut">
               <a:rPr lang="en-US" smtClean="0"/>
-              <a:t>2/3/2017</a:t>
+              <a:t>03-Feb-17</a:t>
             </a:fld>
             <a:endParaRPr lang="en-US"/>
           </a:p>
@@ -602,7 +602,7 @@
           <a:p>
             <a:fld id="{E4D96187-924C-44A2-A7A8-F3B9288F3254}" type="datetimeFigureOut">
               <a:rPr lang="en-US" smtClean="0"/>
-              <a:t>2/3/2017</a:t>
+              <a:t>03-Feb-17</a:t>
             </a:fld>
             <a:endParaRPr lang="en-US"/>
           </a:p>
@@ -770,7 +770,7 @@
           <a:p>
             <a:fld id="{E4D96187-924C-44A2-A7A8-F3B9288F3254}" type="datetimeFigureOut">
               <a:rPr lang="en-US" smtClean="0"/>
-              <a:t>2/3/2017</a:t>
+              <a:t>03-Feb-17</a:t>
             </a:fld>
             <a:endParaRPr lang="en-US"/>
           </a:p>
@@ -1015,7 +1015,7 @@
           <a:p>
             <a:fld id="{E4D96187-924C-44A2-A7A8-F3B9288F3254}" type="datetimeFigureOut">
               <a:rPr lang="en-US" smtClean="0"/>
-              <a:t>2/3/2017</a:t>
+              <a:t>03-Feb-17</a:t>
             </a:fld>
             <a:endParaRPr lang="en-US"/>
           </a:p>
@@ -1244,7 +1244,7 @@
           <a:p>
             <a:fld id="{E4D96187-924C-44A2-A7A8-F3B9288F3254}" type="datetimeFigureOut">
               <a:rPr lang="en-US" smtClean="0"/>
-              <a:t>2/3/2017</a:t>
+              <a:t>03-Feb-17</a:t>
             </a:fld>
             <a:endParaRPr lang="en-US"/>
           </a:p>
@@ -1608,7 +1608,7 @@
           <a:p>
             <a:fld id="{E4D96187-924C-44A2-A7A8-F3B9288F3254}" type="datetimeFigureOut">
               <a:rPr lang="en-US" smtClean="0"/>
-              <a:t>2/3/2017</a:t>
+              <a:t>03-Feb-17</a:t>
             </a:fld>
             <a:endParaRPr lang="en-US"/>
           </a:p>
@@ -1725,7 +1725,7 @@
           <a:p>
             <a:fld id="{E4D96187-924C-44A2-A7A8-F3B9288F3254}" type="datetimeFigureOut">
               <a:rPr lang="en-US" smtClean="0"/>
-              <a:t>2/3/2017</a:t>
+              <a:t>03-Feb-17</a:t>
             </a:fld>
             <a:endParaRPr lang="en-US"/>
           </a:p>
@@ -1820,7 +1820,7 @@
           <a:p>
             <a:fld id="{E4D96187-924C-44A2-A7A8-F3B9288F3254}" type="datetimeFigureOut">
               <a:rPr lang="en-US" smtClean="0"/>
-              <a:t>2/3/2017</a:t>
+              <a:t>03-Feb-17</a:t>
             </a:fld>
             <a:endParaRPr lang="en-US"/>
           </a:p>
@@ -2095,7 +2095,7 @@
           <a:p>
             <a:fld id="{E4D96187-924C-44A2-A7A8-F3B9288F3254}" type="datetimeFigureOut">
               <a:rPr lang="en-US" smtClean="0"/>
-              <a:t>2/3/2017</a:t>
+              <a:t>03-Feb-17</a:t>
             </a:fld>
             <a:endParaRPr lang="en-US"/>
           </a:p>
@@ -2347,7 +2347,7 @@
           <a:p>
             <a:fld id="{E4D96187-924C-44A2-A7A8-F3B9288F3254}" type="datetimeFigureOut">
               <a:rPr lang="en-US" smtClean="0"/>
-              <a:t>2/3/2017</a:t>
+              <a:t>03-Feb-17</a:t>
             </a:fld>
             <a:endParaRPr lang="en-US"/>
           </a:p>
@@ -2558,7 +2558,7 @@
           <a:p>
             <a:fld id="{E4D96187-924C-44A2-A7A8-F3B9288F3254}" type="datetimeFigureOut">
               <a:rPr lang="en-US" smtClean="0"/>
-              <a:t>2/3/2017</a:t>
+              <a:t>03-Feb-17</a:t>
             </a:fld>
             <a:endParaRPr lang="en-US"/>
           </a:p>
@@ -3068,10 +3068,9 @@
           <a:p>
             <a:pPr algn="ctr"/>
             <a:r>
-              <a:rPr lang="en-US" i="1" dirty="0" smtClean="0"/>
+              <a:rPr lang="en-US" i="1" dirty="0"/>
               <a:t>Hack without fear!</a:t>
             </a:r>
-            <a:endParaRPr lang="en-US" i="1" dirty="0"/>
           </a:p>
         </p:txBody>
       </p:sp>
@@ -3152,11 +3151,11 @@
           <a:lstStyle/>
           <a:p>
             <a:r>
-              <a:rPr lang="en-US" sz="800" i="1" dirty="0" smtClean="0"/>
+              <a:rPr lang="en-US" sz="800" i="1" dirty="0"/>
               <a:t>Image Borrowed from Nicholas </a:t>
             </a:r>
             <a:r>
-              <a:rPr lang="en-US" sz="800" i="1" dirty="0" err="1" smtClean="0"/>
+              <a:rPr lang="en-US" sz="800" i="1" dirty="0" err="1"/>
               <a:t>Matsakis</a:t>
             </a:r>
             <a:endParaRPr lang="en-US" sz="800" i="1" dirty="0"/>
@@ -3240,11 +3239,11 @@
           <a:lstStyle/>
           <a:p>
             <a:r>
-              <a:rPr lang="en-US" sz="800" i="1" dirty="0" smtClean="0"/>
+              <a:rPr lang="en-US" sz="800" i="1" dirty="0"/>
               <a:t>Image Borrowed from Nicholas </a:t>
             </a:r>
             <a:r>
-              <a:rPr lang="en-US" sz="800" i="1" dirty="0" err="1" smtClean="0"/>
+              <a:rPr lang="en-US" sz="800" i="1" dirty="0" err="1"/>
               <a:t>Matsakis</a:t>
             </a:r>
             <a:endParaRPr lang="en-US" sz="800" i="1" dirty="0"/>
@@ -3328,11 +3327,11 @@
           <a:lstStyle/>
           <a:p>
             <a:r>
-              <a:rPr lang="en-US" sz="800" i="1" dirty="0" smtClean="0"/>
+              <a:rPr lang="en-US" sz="800" i="1" dirty="0"/>
               <a:t>Image Borrowed from Nicholas </a:t>
             </a:r>
             <a:r>
-              <a:rPr lang="en-US" sz="800" i="1" dirty="0" err="1" smtClean="0"/>
+              <a:rPr lang="en-US" sz="800" i="1" dirty="0" err="1"/>
               <a:t>Matsakis</a:t>
             </a:r>
             <a:endParaRPr lang="en-US" sz="800" i="1" dirty="0"/>
@@ -3416,11 +3415,11 @@
           <a:lstStyle/>
           <a:p>
             <a:r>
-              <a:rPr lang="en-US" sz="800" i="1" dirty="0" smtClean="0"/>
+              <a:rPr lang="en-US" sz="800" i="1" dirty="0"/>
               <a:t>Image Borrowed from Nicholas </a:t>
             </a:r>
             <a:r>
-              <a:rPr lang="en-US" sz="800" i="1" dirty="0" err="1" smtClean="0"/>
+              <a:rPr lang="en-US" sz="800" i="1" dirty="0" err="1"/>
               <a:t>Matsakis</a:t>
             </a:r>
             <a:endParaRPr lang="en-US" sz="800" i="1" dirty="0"/>
@@ -3504,11 +3503,11 @@
           <a:lstStyle/>
           <a:p>
             <a:r>
-              <a:rPr lang="en-US" sz="800" i="1" dirty="0" smtClean="0"/>
+              <a:rPr lang="en-US" sz="800" i="1" dirty="0"/>
               <a:t>Image Borrowed from Nicholas </a:t>
             </a:r>
             <a:r>
-              <a:rPr lang="en-US" sz="800" i="1" dirty="0" err="1" smtClean="0"/>
+              <a:rPr lang="en-US" sz="800" i="1" dirty="0" err="1"/>
               <a:t>Matsakis</a:t>
             </a:r>
             <a:endParaRPr lang="en-US" sz="800" i="1" dirty="0"/>
@@ -3561,10 +3560,9 @@
           <a:lstStyle/>
           <a:p>
             <a:r>
-              <a:rPr lang="en-US" dirty="0" smtClean="0"/>
+              <a:rPr lang="en-US" dirty="0"/>
               <a:t>Test suite</a:t>
             </a:r>
-            <a:endParaRPr lang="en-US" dirty="0"/>
           </a:p>
         </p:txBody>
       </p:sp>
@@ -3584,8 +3582,17 @@
           <a:lstStyle/>
           <a:p>
             <a:r>
-              <a:rPr lang="en-US" dirty="0" smtClean="0"/>
+              <a:rPr lang="en-US" dirty="0"/>
               <a:t>Demo</a:t>
+            </a:r>
+          </a:p>
+          <a:p>
+            <a:pPr marL="457200" lvl="1" indent="0">
+              <a:buNone/>
+            </a:pPr>
+            <a:r>
+              <a:rPr lang="en-US" dirty="0"/>
+              <a:t>https://github.com/sherry-ummen/RustMeetup/blob/master/Meetup03022017/demo1/src/main.rs#L92</a:t>
             </a:r>
             <a:endParaRPr lang="en-US" dirty="0"/>
           </a:p>
@@ -3643,10 +3650,9 @@
           <a:p>
             <a:pPr algn="ctr"/>
             <a:r>
-              <a:rPr lang="en-US" dirty="0" smtClean="0"/>
+              <a:rPr lang="en-US" dirty="0"/>
               <a:t>That’s all folks</a:t>
             </a:r>
-            <a:endParaRPr lang="en-US" dirty="0"/>
           </a:p>
         </p:txBody>
       </p:sp>
@@ -3674,10 +3680,9 @@
               <a:buNone/>
             </a:pPr>
             <a:r>
-              <a:rPr lang="en-US" dirty="0" smtClean="0"/>
+              <a:rPr lang="en-US" dirty="0"/>
               <a:t>Thank you</a:t>
             </a:r>
-            <a:endParaRPr lang="en-US" dirty="0"/>
           </a:p>
         </p:txBody>
       </p:sp>
@@ -3840,27 +3845,15 @@
           </a:p>
           <a:p>
             <a:r>
-              <a:rPr lang="en-US" dirty="0" smtClean="0">
-                <a:sym typeface="Wingdings" panose="05000000000000000000" pitchFamily="2" charset="2"/>
-              </a:rPr>
-              <a:t>And its </a:t>
-            </a:r>
-            <a:r>
               <a:rPr lang="en-US" dirty="0">
                 <a:sym typeface="Wingdings" panose="05000000000000000000" pitchFamily="2" charset="2"/>
               </a:rPr>
-              <a:t>not about saying that Rust is the best programming language</a:t>
-            </a:r>
-            <a:r>
-              <a:rPr lang="en-US" dirty="0" smtClean="0">
-                <a:sym typeface="Wingdings" panose="05000000000000000000" pitchFamily="2" charset="2"/>
-              </a:rPr>
-              <a:t>.</a:t>
-            </a:r>
-          </a:p>
-          <a:p>
-            <a:r>
-              <a:rPr lang="en-US" dirty="0" smtClean="0">
+              <a:t>And its not about saying that Rust is the best programming language.</a:t>
+            </a:r>
+          </a:p>
+          <a:p>
+            <a:r>
+              <a:rPr lang="en-US" dirty="0">
                 <a:sym typeface="Wingdings" panose="05000000000000000000" pitchFamily="2" charset="2"/>
               </a:rPr>
               <a:t>I am not a native code programmer.</a:t>
@@ -4397,8 +4390,17 @@
           <a:lstStyle/>
           <a:p>
             <a:r>
-              <a:rPr lang="en-US" dirty="0" smtClean="0"/>
+              <a:rPr lang="en-US" dirty="0"/>
               <a:t>DEMO</a:t>
+            </a:r>
+          </a:p>
+          <a:p>
+            <a:pPr marL="457200" lvl="1" indent="0">
+              <a:buNone/>
+            </a:pPr>
+            <a:r>
+              <a:rPr lang="en-US" dirty="0"/>
+              <a:t>https://github.com/sherry-ummen/RustMeetup/blob/master/Meetup03022017/demo1/src/main.rs</a:t>
             </a:r>
             <a:endParaRPr lang="en-US" dirty="0"/>
           </a:p>
@@ -4450,10 +4452,9 @@
           <a:lstStyle/>
           <a:p>
             <a:r>
-              <a:rPr lang="en-US" dirty="0" smtClean="0"/>
+              <a:rPr lang="en-US" dirty="0"/>
               <a:t>Ownership and Borrowing</a:t>
             </a:r>
-            <a:endParaRPr lang="en-US" dirty="0"/>
           </a:p>
         </p:txBody>
       </p:sp>
@@ -4504,11 +4505,11 @@
           <a:lstStyle/>
           <a:p>
             <a:r>
-              <a:rPr lang="en-US" sz="800" i="1" dirty="0" smtClean="0"/>
+              <a:rPr lang="en-US" sz="800" i="1" dirty="0"/>
               <a:t>Image Borrowed from Nicholas </a:t>
             </a:r>
             <a:r>
-              <a:rPr lang="en-US" sz="800" i="1" dirty="0" err="1" smtClean="0"/>
+              <a:rPr lang="en-US" sz="800" i="1" dirty="0" err="1"/>
               <a:t>Matsakis</a:t>
             </a:r>
             <a:endParaRPr lang="en-US" sz="800" i="1" dirty="0"/>

</xml_diff>